<commit_message>
fix: adding svg images; feature: duration
</commit_message>
<xml_diff>
--- a/__tests__/pptx-templates/SlideWithImages.pptx
+++ b/__tests__/pptx-templates/SlideWithImages.pptx
@@ -3570,6 +3570,80 @@
           </a:prstGeom>
         </p:spPr>
       </p:pic>
+      <p:pic>
+        <p:nvPicPr>
+          <p:cNvPr id="7" name="imageSVG">
+            <a:extLst>
+              <a:ext uri="{FF2B5EF4-FFF2-40B4-BE49-F238E27FC236}">
+                <a16:creationId xmlns:a16="http://schemas.microsoft.com/office/drawing/2014/main" id="{C0548863-3E4E-4D4B-A814-7936EB2889F9}"/>
+              </a:ext>
+            </a:extLst>
+          </p:cNvPr>
+          <p:cNvPicPr>
+            <a:picLocks noChangeAspect="1"/>
+          </p:cNvPicPr>
+          <p:nvPr/>
+        </p:nvPicPr>
+        <p:blipFill>
+          <a:blip r:embed="rId4">
+            <a:extLst>
+              <a:ext uri="{28A0092B-C50C-407E-A947-70E740481C1C}">
+                <a14:useLocalDpi xmlns:a14="http://schemas.microsoft.com/office/drawing/2010/main" val="0"/>
+              </a:ext>
+              <a:ext uri="{96DAC541-7B7A-43D3-8B79-37D633B846F1}">
+                <asvg:svgBlip xmlns:asvg="http://schemas.microsoft.com/office/drawing/2016/SVG/main" r:embed="rId5"/>
+              </a:ext>
+            </a:extLst>
+          </a:blip>
+          <a:stretch>
+            <a:fillRect/>
+          </a:stretch>
+        </p:blipFill>
+        <p:spPr>
+          <a:xfrm>
+            <a:off x="2175932" y="3059668"/>
+            <a:ext cx="369332" cy="369332"/>
+          </a:xfrm>
+          <a:prstGeom prst="rect">
+            <a:avLst/>
+          </a:prstGeom>
+        </p:spPr>
+      </p:pic>
+      <p:sp>
+        <p:nvSpPr>
+          <p:cNvPr id="8" name="Textfeld 7">
+            <a:extLst>
+              <a:ext uri="{FF2B5EF4-FFF2-40B4-BE49-F238E27FC236}">
+                <a16:creationId xmlns:a16="http://schemas.microsoft.com/office/drawing/2014/main" id="{E3804C7F-A0B4-4093-86E0-B6CC3B10DFDF}"/>
+              </a:ext>
+            </a:extLst>
+          </p:cNvPr>
+          <p:cNvSpPr txBox="1"/>
+          <p:nvPr/>
+        </p:nvSpPr>
+        <p:spPr>
+          <a:xfrm>
+            <a:off x="1430867" y="3059668"/>
+            <a:ext cx="481029" cy="369332"/>
+          </a:xfrm>
+          <a:prstGeom prst="rect">
+            <a:avLst/>
+          </a:prstGeom>
+          <a:noFill/>
+        </p:spPr>
+        <p:txBody>
+          <a:bodyPr wrap="none" rtlCol="0">
+            <a:spAutoFit/>
+          </a:bodyPr>
+          <a:lstStyle/>
+          <a:p>
+            <a:r>
+              <a:rPr lang="de-DE"/>
+              <a:t>svg</a:t>
+            </a:r>
+          </a:p>
+        </p:txBody>
+      </p:sp>
     </p:spTree>
     <p:extLst>
       <p:ext uri="{BB962C8B-B14F-4D97-AF65-F5344CB8AC3E}">

</xml_diff>

<commit_message>
chore(test): add external png to media dir; add duotone example to SlideWithImages.pptx
</commit_message>
<xml_diff>
--- a/__tests__/pptx-templates/SlideWithImages.pptx
+++ b/__tests__/pptx-templates/SlideWithImages.pptx
@@ -260,7 +260,7 @@
           <a:p>
             <a:fld id="{8FB60A0F-5ED1-45ED-A5D5-DB038E6B70D9}" type="datetimeFigureOut">
               <a:rPr lang="de-DE" smtClean="0"/>
-              <a:t>16.03.2021</a:t>
+              <a:t>12.10.2023</a:t>
             </a:fld>
             <a:endParaRPr lang="de-DE"/>
           </a:p>
@@ -458,7 +458,7 @@
           <a:p>
             <a:fld id="{8FB60A0F-5ED1-45ED-A5D5-DB038E6B70D9}" type="datetimeFigureOut">
               <a:rPr lang="de-DE" smtClean="0"/>
-              <a:t>16.03.2021</a:t>
+              <a:t>12.10.2023</a:t>
             </a:fld>
             <a:endParaRPr lang="de-DE"/>
           </a:p>
@@ -666,7 +666,7 @@
           <a:p>
             <a:fld id="{8FB60A0F-5ED1-45ED-A5D5-DB038E6B70D9}" type="datetimeFigureOut">
               <a:rPr lang="de-DE" smtClean="0"/>
-              <a:t>16.03.2021</a:t>
+              <a:t>12.10.2023</a:t>
             </a:fld>
             <a:endParaRPr lang="de-DE"/>
           </a:p>
@@ -864,7 +864,7 @@
           <a:p>
             <a:fld id="{8FB60A0F-5ED1-45ED-A5D5-DB038E6B70D9}" type="datetimeFigureOut">
               <a:rPr lang="de-DE" smtClean="0"/>
-              <a:t>16.03.2021</a:t>
+              <a:t>12.10.2023</a:t>
             </a:fld>
             <a:endParaRPr lang="de-DE"/>
           </a:p>
@@ -1139,7 +1139,7 @@
           <a:p>
             <a:fld id="{8FB60A0F-5ED1-45ED-A5D5-DB038E6B70D9}" type="datetimeFigureOut">
               <a:rPr lang="de-DE" smtClean="0"/>
-              <a:t>16.03.2021</a:t>
+              <a:t>12.10.2023</a:t>
             </a:fld>
             <a:endParaRPr lang="de-DE"/>
           </a:p>
@@ -1404,7 +1404,7 @@
           <a:p>
             <a:fld id="{8FB60A0F-5ED1-45ED-A5D5-DB038E6B70D9}" type="datetimeFigureOut">
               <a:rPr lang="de-DE" smtClean="0"/>
-              <a:t>16.03.2021</a:t>
+              <a:t>12.10.2023</a:t>
             </a:fld>
             <a:endParaRPr lang="de-DE"/>
           </a:p>
@@ -1816,7 +1816,7 @@
           <a:p>
             <a:fld id="{8FB60A0F-5ED1-45ED-A5D5-DB038E6B70D9}" type="datetimeFigureOut">
               <a:rPr lang="de-DE" smtClean="0"/>
-              <a:t>16.03.2021</a:t>
+              <a:t>12.10.2023</a:t>
             </a:fld>
             <a:endParaRPr lang="de-DE"/>
           </a:p>
@@ -1957,7 +1957,7 @@
           <a:p>
             <a:fld id="{8FB60A0F-5ED1-45ED-A5D5-DB038E6B70D9}" type="datetimeFigureOut">
               <a:rPr lang="de-DE" smtClean="0"/>
-              <a:t>16.03.2021</a:t>
+              <a:t>12.10.2023</a:t>
             </a:fld>
             <a:endParaRPr lang="de-DE"/>
           </a:p>
@@ -2070,7 +2070,7 @@
           <a:p>
             <a:fld id="{8FB60A0F-5ED1-45ED-A5D5-DB038E6B70D9}" type="datetimeFigureOut">
               <a:rPr lang="de-DE" smtClean="0"/>
-              <a:t>16.03.2021</a:t>
+              <a:t>12.10.2023</a:t>
             </a:fld>
             <a:endParaRPr lang="de-DE"/>
           </a:p>
@@ -2381,7 +2381,7 @@
           <a:p>
             <a:fld id="{8FB60A0F-5ED1-45ED-A5D5-DB038E6B70D9}" type="datetimeFigureOut">
               <a:rPr lang="de-DE" smtClean="0"/>
-              <a:t>16.03.2021</a:t>
+              <a:t>12.10.2023</a:t>
             </a:fld>
             <a:endParaRPr lang="de-DE"/>
           </a:p>
@@ -2669,7 +2669,7 @@
           <a:p>
             <a:fld id="{8FB60A0F-5ED1-45ED-A5D5-DB038E6B70D9}" type="datetimeFigureOut">
               <a:rPr lang="de-DE" smtClean="0"/>
-              <a:t>16.03.2021</a:t>
+              <a:t>12.10.2023</a:t>
             </a:fld>
             <a:endParaRPr lang="de-DE"/>
           </a:p>
@@ -2910,7 +2910,7 @@
           <a:p>
             <a:fld id="{8FB60A0F-5ED1-45ED-A5D5-DB038E6B70D9}" type="datetimeFigureOut">
               <a:rPr lang="de-DE" smtClean="0"/>
-              <a:t>16.03.2021</a:t>
+              <a:t>12.10.2023</a:t>
             </a:fld>
             <a:endParaRPr lang="de-DE"/>
           </a:p>
@@ -3644,6 +3644,84 @@
           </a:p>
         </p:txBody>
       </p:sp>
+      <p:sp>
+        <p:nvSpPr>
+          <p:cNvPr id="9" name="Textfeld 8">
+            <a:extLst>
+              <a:ext uri="{FF2B5EF4-FFF2-40B4-BE49-F238E27FC236}">
+                <a16:creationId xmlns:a16="http://schemas.microsoft.com/office/drawing/2014/main" id="{AA3B5606-10FE-4052-A21D-85439C8865BB}"/>
+              </a:ext>
+            </a:extLst>
+          </p:cNvPr>
+          <p:cNvSpPr txBox="1"/>
+          <p:nvPr/>
+        </p:nvSpPr>
+        <p:spPr>
+          <a:xfrm>
+            <a:off x="713875" y="3660801"/>
+            <a:ext cx="1389483" cy="369332"/>
+          </a:xfrm>
+          <a:prstGeom prst="rect">
+            <a:avLst/>
+          </a:prstGeom>
+          <a:noFill/>
+        </p:spPr>
+        <p:txBody>
+          <a:bodyPr wrap="none" rtlCol="0">
+            <a:spAutoFit/>
+          </a:bodyPr>
+          <a:lstStyle/>
+          <a:p>
+            <a:r>
+              <a:rPr lang="de-DE"/>
+              <a:t>png duotone</a:t>
+            </a:r>
+          </a:p>
+        </p:txBody>
+      </p:sp>
+      <p:pic>
+        <p:nvPicPr>
+          <p:cNvPr id="10" name="imagePNGduotone">
+            <a:extLst>
+              <a:ext uri="{FF2B5EF4-FFF2-40B4-BE49-F238E27FC236}">
+                <a16:creationId xmlns:a16="http://schemas.microsoft.com/office/drawing/2014/main" id="{22500EC4-A53D-4923-BA7C-9FD4CD0AA876}"/>
+              </a:ext>
+            </a:extLst>
+          </p:cNvPr>
+          <p:cNvPicPr>
+            <a:picLocks noChangeAspect="1"/>
+          </p:cNvPicPr>
+          <p:nvPr/>
+        </p:nvPicPr>
+        <p:blipFill>
+          <a:blip r:embed="rId3">
+            <a:duotone>
+              <a:prstClr val="black"/>
+              <a:srgbClr val="B6D3ED">
+                <a:tint val="45000"/>
+                <a:satMod val="400000"/>
+              </a:srgbClr>
+            </a:duotone>
+            <a:extLst>
+              <a:ext uri="{28A0092B-C50C-407E-A947-70E740481C1C}">
+                <a14:useLocalDpi xmlns:a14="http://schemas.microsoft.com/office/drawing/2010/main" val="0"/>
+              </a:ext>
+            </a:extLst>
+          </a:blip>
+          <a:stretch>
+            <a:fillRect/>
+          </a:stretch>
+        </p:blipFill>
+        <p:spPr>
+          <a:xfrm>
+            <a:off x="2106422" y="3695114"/>
+            <a:ext cx="609601" cy="393193"/>
+          </a:xfrm>
+          <a:prstGeom prst="rect">
+            <a:avLst/>
+          </a:prstGeom>
+        </p:spPr>
+      </p:pic>
     </p:spTree>
     <p:extLst>
       <p:ext uri="{BB962C8B-B14F-4D97-AF65-F5344CB8AC3E}">

</xml_diff>

<commit_message>
Add Alt Text test
</commit_message>
<xml_diff>
--- a/__tests__/pptx-templates/SlideWithImages.pptx
+++ b/__tests__/pptx-templates/SlideWithImages.pptx
@@ -260,7 +260,7 @@
           <a:p>
             <a:fld id="{8FB60A0F-5ED1-45ED-A5D5-DB038E6B70D9}" type="datetimeFigureOut">
               <a:rPr lang="de-DE" smtClean="0"/>
-              <a:t>12.10.2023</a:t>
+              <a:t>06.08.24</a:t>
             </a:fld>
             <a:endParaRPr lang="de-DE"/>
           </a:p>
@@ -314,7 +314,7 @@
           <a:p>
             <a:fld id="{79EC11F7-4BC3-48C3-B478-6F3548E7B183}" type="slidenum">
               <a:rPr lang="de-DE" smtClean="0"/>
-              <a:t>‹Nr.›</a:t>
+              <a:t>‹#›</a:t>
             </a:fld>
             <a:endParaRPr lang="de-DE"/>
           </a:p>
@@ -458,7 +458,7 @@
           <a:p>
             <a:fld id="{8FB60A0F-5ED1-45ED-A5D5-DB038E6B70D9}" type="datetimeFigureOut">
               <a:rPr lang="de-DE" smtClean="0"/>
-              <a:t>12.10.2023</a:t>
+              <a:t>06.08.24</a:t>
             </a:fld>
             <a:endParaRPr lang="de-DE"/>
           </a:p>
@@ -512,7 +512,7 @@
           <a:p>
             <a:fld id="{79EC11F7-4BC3-48C3-B478-6F3548E7B183}" type="slidenum">
               <a:rPr lang="de-DE" smtClean="0"/>
-              <a:t>‹Nr.›</a:t>
+              <a:t>‹#›</a:t>
             </a:fld>
             <a:endParaRPr lang="de-DE"/>
           </a:p>
@@ -666,7 +666,7 @@
           <a:p>
             <a:fld id="{8FB60A0F-5ED1-45ED-A5D5-DB038E6B70D9}" type="datetimeFigureOut">
               <a:rPr lang="de-DE" smtClean="0"/>
-              <a:t>12.10.2023</a:t>
+              <a:t>06.08.24</a:t>
             </a:fld>
             <a:endParaRPr lang="de-DE"/>
           </a:p>
@@ -720,7 +720,7 @@
           <a:p>
             <a:fld id="{79EC11F7-4BC3-48C3-B478-6F3548E7B183}" type="slidenum">
               <a:rPr lang="de-DE" smtClean="0"/>
-              <a:t>‹Nr.›</a:t>
+              <a:t>‹#›</a:t>
             </a:fld>
             <a:endParaRPr lang="de-DE"/>
           </a:p>
@@ -864,7 +864,7 @@
           <a:p>
             <a:fld id="{8FB60A0F-5ED1-45ED-A5D5-DB038E6B70D9}" type="datetimeFigureOut">
               <a:rPr lang="de-DE" smtClean="0"/>
-              <a:t>12.10.2023</a:t>
+              <a:t>06.08.24</a:t>
             </a:fld>
             <a:endParaRPr lang="de-DE"/>
           </a:p>
@@ -918,7 +918,7 @@
           <a:p>
             <a:fld id="{79EC11F7-4BC3-48C3-B478-6F3548E7B183}" type="slidenum">
               <a:rPr lang="de-DE" smtClean="0"/>
-              <a:t>‹Nr.›</a:t>
+              <a:t>‹#›</a:t>
             </a:fld>
             <a:endParaRPr lang="de-DE"/>
           </a:p>
@@ -1139,7 +1139,7 @@
           <a:p>
             <a:fld id="{8FB60A0F-5ED1-45ED-A5D5-DB038E6B70D9}" type="datetimeFigureOut">
               <a:rPr lang="de-DE" smtClean="0"/>
-              <a:t>12.10.2023</a:t>
+              <a:t>06.08.24</a:t>
             </a:fld>
             <a:endParaRPr lang="de-DE"/>
           </a:p>
@@ -1193,7 +1193,7 @@
           <a:p>
             <a:fld id="{79EC11F7-4BC3-48C3-B478-6F3548E7B183}" type="slidenum">
               <a:rPr lang="de-DE" smtClean="0"/>
-              <a:t>‹Nr.›</a:t>
+              <a:t>‹#›</a:t>
             </a:fld>
             <a:endParaRPr lang="de-DE"/>
           </a:p>
@@ -1404,7 +1404,7 @@
           <a:p>
             <a:fld id="{8FB60A0F-5ED1-45ED-A5D5-DB038E6B70D9}" type="datetimeFigureOut">
               <a:rPr lang="de-DE" smtClean="0"/>
-              <a:t>12.10.2023</a:t>
+              <a:t>06.08.24</a:t>
             </a:fld>
             <a:endParaRPr lang="de-DE"/>
           </a:p>
@@ -1458,7 +1458,7 @@
           <a:p>
             <a:fld id="{79EC11F7-4BC3-48C3-B478-6F3548E7B183}" type="slidenum">
               <a:rPr lang="de-DE" smtClean="0"/>
-              <a:t>‹Nr.›</a:t>
+              <a:t>‹#›</a:t>
             </a:fld>
             <a:endParaRPr lang="de-DE"/>
           </a:p>
@@ -1816,7 +1816,7 @@
           <a:p>
             <a:fld id="{8FB60A0F-5ED1-45ED-A5D5-DB038E6B70D9}" type="datetimeFigureOut">
               <a:rPr lang="de-DE" smtClean="0"/>
-              <a:t>12.10.2023</a:t>
+              <a:t>06.08.24</a:t>
             </a:fld>
             <a:endParaRPr lang="de-DE"/>
           </a:p>
@@ -1870,7 +1870,7 @@
           <a:p>
             <a:fld id="{79EC11F7-4BC3-48C3-B478-6F3548E7B183}" type="slidenum">
               <a:rPr lang="de-DE" smtClean="0"/>
-              <a:t>‹Nr.›</a:t>
+              <a:t>‹#›</a:t>
             </a:fld>
             <a:endParaRPr lang="de-DE"/>
           </a:p>
@@ -1957,7 +1957,7 @@
           <a:p>
             <a:fld id="{8FB60A0F-5ED1-45ED-A5D5-DB038E6B70D9}" type="datetimeFigureOut">
               <a:rPr lang="de-DE" smtClean="0"/>
-              <a:t>12.10.2023</a:t>
+              <a:t>06.08.24</a:t>
             </a:fld>
             <a:endParaRPr lang="de-DE"/>
           </a:p>
@@ -2011,7 +2011,7 @@
           <a:p>
             <a:fld id="{79EC11F7-4BC3-48C3-B478-6F3548E7B183}" type="slidenum">
               <a:rPr lang="de-DE" smtClean="0"/>
-              <a:t>‹Nr.›</a:t>
+              <a:t>‹#›</a:t>
             </a:fld>
             <a:endParaRPr lang="de-DE"/>
           </a:p>
@@ -2070,7 +2070,7 @@
           <a:p>
             <a:fld id="{8FB60A0F-5ED1-45ED-A5D5-DB038E6B70D9}" type="datetimeFigureOut">
               <a:rPr lang="de-DE" smtClean="0"/>
-              <a:t>12.10.2023</a:t>
+              <a:t>06.08.24</a:t>
             </a:fld>
             <a:endParaRPr lang="de-DE"/>
           </a:p>
@@ -2124,7 +2124,7 @@
           <a:p>
             <a:fld id="{79EC11F7-4BC3-48C3-B478-6F3548E7B183}" type="slidenum">
               <a:rPr lang="de-DE" smtClean="0"/>
-              <a:t>‹Nr.›</a:t>
+              <a:t>‹#›</a:t>
             </a:fld>
             <a:endParaRPr lang="de-DE"/>
           </a:p>
@@ -2381,7 +2381,7 @@
           <a:p>
             <a:fld id="{8FB60A0F-5ED1-45ED-A5D5-DB038E6B70D9}" type="datetimeFigureOut">
               <a:rPr lang="de-DE" smtClean="0"/>
-              <a:t>12.10.2023</a:t>
+              <a:t>06.08.24</a:t>
             </a:fld>
             <a:endParaRPr lang="de-DE"/>
           </a:p>
@@ -2435,7 +2435,7 @@
           <a:p>
             <a:fld id="{79EC11F7-4BC3-48C3-B478-6F3548E7B183}" type="slidenum">
               <a:rPr lang="de-DE" smtClean="0"/>
-              <a:t>‹Nr.›</a:t>
+              <a:t>‹#›</a:t>
             </a:fld>
             <a:endParaRPr lang="de-DE"/>
           </a:p>
@@ -2669,7 +2669,7 @@
           <a:p>
             <a:fld id="{8FB60A0F-5ED1-45ED-A5D5-DB038E6B70D9}" type="datetimeFigureOut">
               <a:rPr lang="de-DE" smtClean="0"/>
-              <a:t>12.10.2023</a:t>
+              <a:t>06.08.24</a:t>
             </a:fld>
             <a:endParaRPr lang="de-DE"/>
           </a:p>
@@ -2723,7 +2723,7 @@
           <a:p>
             <a:fld id="{79EC11F7-4BC3-48C3-B478-6F3548E7B183}" type="slidenum">
               <a:rPr lang="de-DE" smtClean="0"/>
-              <a:t>‹Nr.›</a:t>
+              <a:t>‹#›</a:t>
             </a:fld>
             <a:endParaRPr lang="de-DE"/>
           </a:p>
@@ -2910,7 +2910,7 @@
           <a:p>
             <a:fld id="{8FB60A0F-5ED1-45ED-A5D5-DB038E6B70D9}" type="datetimeFigureOut">
               <a:rPr lang="de-DE" smtClean="0"/>
-              <a:t>12.10.2023</a:t>
+              <a:t>06.08.24</a:t>
             </a:fld>
             <a:endParaRPr lang="de-DE"/>
           </a:p>
@@ -3000,7 +3000,7 @@
           <a:p>
             <a:fld id="{79EC11F7-4BC3-48C3-B478-6F3548E7B183}" type="slidenum">
               <a:rPr lang="de-DE" smtClean="0"/>
-              <a:t>‹Nr.›</a:t>
+              <a:t>‹#›</a:t>
             </a:fld>
             <a:endParaRPr lang="de-DE"/>
           </a:p>
@@ -3329,7 +3329,7 @@
       </p:grpSpPr>
       <p:pic>
         <p:nvPicPr>
-          <p:cNvPr id="6" name="Grafik 5">
+          <p:cNvPr id="6" name="Grafik 5" descr="picture">
             <a:extLst>
               <a:ext uri="{FF2B5EF4-FFF2-40B4-BE49-F238E27FC236}">
                 <a16:creationId xmlns:a16="http://schemas.microsoft.com/office/drawing/2014/main" id="{B5F0CCA3-855D-4D82-A963-EE176A3C9C9A}"/>

</xml_diff>